<commit_message>
Phase 1 latest corrections applied
</commit_message>
<xml_diff>
--- a/ui/Mockups/2.0 Mockup.pptx
+++ b/ui/Mockups/2.0 Mockup.pptx
@@ -131,33 +131,12 @@
   <pc:docChgLst>
     <pc:chgData name="Matthew Dodds" userId="80d5a6ea92063750" providerId="LiveId" clId="{614D3421-716A-4CB0-994B-C24DF82A0F6F}"/>
     <pc:docChg chg="undo custSel addSld delSld modSld sldOrd">
-      <pc:chgData name="Matthew Dodds" userId="80d5a6ea92063750" providerId="LiveId" clId="{614D3421-716A-4CB0-994B-C24DF82A0F6F}" dt="2025-12-08T14:02:03.436" v="626" actId="1037"/>
+      <pc:chgData name="Matthew Dodds" userId="80d5a6ea92063750" providerId="LiveId" clId="{614D3421-716A-4CB0-994B-C24DF82A0F6F}" dt="2025-12-10T08:03:25.124" v="632" actId="692"/>
       <pc:docMkLst>
         <pc:docMk/>
       </pc:docMkLst>
-      <pc:sldChg chg="del">
-        <pc:chgData name="Matthew Dodds" userId="80d5a6ea92063750" providerId="LiveId" clId="{614D3421-716A-4CB0-994B-C24DF82A0F6F}" dt="2025-12-07T07:51:01.679" v="1" actId="47"/>
-        <pc:sldMkLst>
-          <pc:docMk/>
-          <pc:sldMk cId="650641705" sldId="269"/>
-        </pc:sldMkLst>
-      </pc:sldChg>
-      <pc:sldChg chg="del">
-        <pc:chgData name="Matthew Dodds" userId="80d5a6ea92063750" providerId="LiveId" clId="{614D3421-716A-4CB0-994B-C24DF82A0F6F}" dt="2025-12-07T07:51:00.399" v="0" actId="47"/>
-        <pc:sldMkLst>
-          <pc:docMk/>
-          <pc:sldMk cId="2651925082" sldId="272"/>
-        </pc:sldMkLst>
-      </pc:sldChg>
-      <pc:sldChg chg="del">
-        <pc:chgData name="Matthew Dodds" userId="80d5a6ea92063750" providerId="LiveId" clId="{614D3421-716A-4CB0-994B-C24DF82A0F6F}" dt="2025-12-07T07:51:05.210" v="2" actId="47"/>
-        <pc:sldMkLst>
-          <pc:docMk/>
-          <pc:sldMk cId="3156259511" sldId="273"/>
-        </pc:sldMkLst>
-      </pc:sldChg>
       <pc:sldChg chg="addSp modSp mod">
-        <pc:chgData name="Matthew Dodds" userId="80d5a6ea92063750" providerId="LiveId" clId="{614D3421-716A-4CB0-994B-C24DF82A0F6F}" dt="2025-12-08T14:02:03.436" v="626" actId="1037"/>
+        <pc:chgData name="Matthew Dodds" userId="80d5a6ea92063750" providerId="LiveId" clId="{614D3421-716A-4CB0-994B-C24DF82A0F6F}" dt="2025-12-10T08:03:25.124" v="632" actId="692"/>
         <pc:sldMkLst>
           <pc:docMk/>
           <pc:sldMk cId="609062764" sldId="274"/>
@@ -168,6 +147,14 @@
             <pc:docMk/>
             <pc:sldMk cId="609062764" sldId="274"/>
             <ac:spMk id="6" creationId="{23AA74E7-8287-FB84-F0B5-0870B01E332A}"/>
+          </ac:spMkLst>
+        </pc:spChg>
+        <pc:spChg chg="mod">
+          <ac:chgData name="Matthew Dodds" userId="80d5a6ea92063750" providerId="LiveId" clId="{614D3421-716A-4CB0-994B-C24DF82A0F6F}" dt="2025-12-10T08:03:25.124" v="632" actId="692"/>
+          <ac:spMkLst>
+            <pc:docMk/>
+            <pc:sldMk cId="609062764" sldId="274"/>
+            <ac:spMk id="18" creationId="{498A6843-FB84-8783-6046-213E49E00B8C}"/>
           </ac:spMkLst>
         </pc:spChg>
         <pc:spChg chg="mod">
@@ -362,13 +349,6 @@
           </ac:cxnSpMkLst>
         </pc:cxnChg>
       </pc:sldChg>
-      <pc:sldChg chg="del">
-        <pc:chgData name="Matthew Dodds" userId="80d5a6ea92063750" providerId="LiveId" clId="{614D3421-716A-4CB0-994B-C24DF82A0F6F}" dt="2025-12-07T07:55:33.967" v="65" actId="47"/>
-        <pc:sldMkLst>
-          <pc:docMk/>
-          <pc:sldMk cId="4229824937" sldId="276"/>
-        </pc:sldMkLst>
-      </pc:sldChg>
       <pc:sldChg chg="addSp delSp modSp mod">
         <pc:chgData name="Matthew Dodds" userId="80d5a6ea92063750" providerId="LiveId" clId="{614D3421-716A-4CB0-994B-C24DF82A0F6F}" dt="2025-12-08T13:58:09.426" v="442" actId="1036"/>
         <pc:sldMkLst>
@@ -381,14 +361,6 @@
             <pc:docMk/>
             <pc:sldMk cId="1268873129" sldId="277"/>
             <ac:spMk id="3" creationId="{B31A8A6F-23DF-99DE-5881-D88ECE8C0FC6}"/>
-          </ac:spMkLst>
-        </pc:spChg>
-        <pc:spChg chg="del">
-          <ac:chgData name="Matthew Dodds" userId="80d5a6ea92063750" providerId="LiveId" clId="{614D3421-716A-4CB0-994B-C24DF82A0F6F}" dt="2025-12-08T06:27:30.163" v="419" actId="478"/>
-          <ac:spMkLst>
-            <pc:docMk/>
-            <pc:sldMk cId="1268873129" sldId="277"/>
-            <ac:spMk id="95" creationId="{84D387BA-9669-8738-25D6-1A58CE4D7FF1}"/>
           </ac:spMkLst>
         </pc:spChg>
         <pc:spChg chg="add mod">
@@ -428,14 +400,6 @@
             <pc:docMk/>
             <pc:sldMk cId="2371583876" sldId="278"/>
             <ac:spMk id="5" creationId="{D428CFBC-ECD4-FA15-C921-E7BE60D235A2}"/>
-          </ac:spMkLst>
-        </pc:spChg>
-        <pc:spChg chg="del">
-          <ac:chgData name="Matthew Dodds" userId="80d5a6ea92063750" providerId="LiveId" clId="{614D3421-716A-4CB0-994B-C24DF82A0F6F}" dt="2025-12-08T06:27:50.895" v="425" actId="478"/>
-          <ac:spMkLst>
-            <pc:docMk/>
-            <pc:sldMk cId="2371583876" sldId="278"/>
-            <ac:spMk id="95" creationId="{4C052397-6DB2-CC96-AAF7-D4220A876F38}"/>
           </ac:spMkLst>
         </pc:spChg>
         <pc:spChg chg="add mod">
@@ -491,14 +455,6 @@
             <pc:docMk/>
             <pc:sldMk cId="3480445554" sldId="279"/>
             <ac:spMk id="74" creationId="{9921A843-D704-84EE-C8ED-7F6915EA8BDC}"/>
-          </ac:spMkLst>
-        </pc:spChg>
-        <pc:spChg chg="del">
-          <ac:chgData name="Matthew Dodds" userId="80d5a6ea92063750" providerId="LiveId" clId="{614D3421-716A-4CB0-994B-C24DF82A0F6F}" dt="2025-12-08T06:27:38.270" v="422" actId="478"/>
-          <ac:spMkLst>
-            <pc:docMk/>
-            <pc:sldMk cId="3480445554" sldId="279"/>
-            <ac:spMk id="95" creationId="{88A92E13-BC9E-AD6B-F749-6481714452C6}"/>
           </ac:spMkLst>
         </pc:spChg>
         <pc:grpChg chg="mod">
@@ -652,14 +608,6 @@
             <ac:spMk id="38" creationId="{CDEF58FA-F570-35A9-8D76-3CF88FBB20D6}"/>
           </ac:spMkLst>
         </pc:spChg>
-        <pc:spChg chg="del">
-          <ac:chgData name="Matthew Dodds" userId="80d5a6ea92063750" providerId="LiveId" clId="{614D3421-716A-4CB0-994B-C24DF82A0F6F}" dt="2025-12-08T06:27:57.721" v="428" actId="478"/>
-          <ac:spMkLst>
-            <pc:docMk/>
-            <pc:sldMk cId="3449670256" sldId="280"/>
-            <ac:spMk id="95" creationId="{1D57ABE6-2219-CDD3-982B-775AC47142BD}"/>
-          </ac:spMkLst>
-        </pc:spChg>
         <pc:grpChg chg="mod">
           <ac:chgData name="Matthew Dodds" userId="80d5a6ea92063750" providerId="LiveId" clId="{614D3421-716A-4CB0-994B-C24DF82A0F6F}" dt="2025-12-07T10:39:16.094" v="220" actId="1036"/>
           <ac:grpSpMkLst>
@@ -677,29 +625,6 @@
           </ac:grpSpMkLst>
         </pc:grpChg>
       </pc:sldChg>
-      <pc:sldChg chg="addSp delSp modSp new del mod setBg">
-        <pc:chgData name="Matthew Dodds" userId="80d5a6ea92063750" providerId="LiveId" clId="{614D3421-716A-4CB0-994B-C24DF82A0F6F}" dt="2025-12-07T18:18:20.329" v="410" actId="47"/>
-        <pc:sldMkLst>
-          <pc:docMk/>
-          <pc:sldMk cId="636671154" sldId="281"/>
-        </pc:sldMkLst>
-        <pc:spChg chg="add mod">
-          <ac:chgData name="Matthew Dodds" userId="80d5a6ea92063750" providerId="LiveId" clId="{614D3421-716A-4CB0-994B-C24DF82A0F6F}" dt="2025-12-07T16:53:45.886" v="394" actId="339"/>
-          <ac:spMkLst>
-            <pc:docMk/>
-            <pc:sldMk cId="636671154" sldId="281"/>
-            <ac:spMk id="4" creationId="{CD89ED3E-8B14-953B-FA6F-DF618D5B059B}"/>
-          </ac:spMkLst>
-        </pc:spChg>
-        <pc:picChg chg="add del mod">
-          <ac:chgData name="Matthew Dodds" userId="80d5a6ea92063750" providerId="LiveId" clId="{614D3421-716A-4CB0-994B-C24DF82A0F6F}" dt="2025-12-07T16:52:51.919" v="389" actId="478"/>
-          <ac:picMkLst>
-            <pc:docMk/>
-            <pc:sldMk cId="636671154" sldId="281"/>
-            <ac:picMk id="3" creationId="{EFE33D3F-61A2-9305-BB6B-F32AC4BEB508}"/>
-          </ac:picMkLst>
-        </pc:picChg>
-      </pc:sldChg>
       <pc:sldChg chg="delSp modSp add mod ord">
         <pc:chgData name="Matthew Dodds" userId="80d5a6ea92063750" providerId="LiveId" clId="{614D3421-716A-4CB0-994B-C24DF82A0F6F}" dt="2025-12-08T06:29:47.190" v="438" actId="14838"/>
         <pc:sldMkLst>
@@ -714,62 +639,6 @@
             <ac:spMk id="5" creationId="{4474B01D-8AA5-0F52-ACED-BFD4BD6F3DD3}"/>
           </ac:spMkLst>
         </pc:spChg>
-        <pc:spChg chg="del">
-          <ac:chgData name="Matthew Dodds" userId="80d5a6ea92063750" providerId="LiveId" clId="{614D3421-716A-4CB0-994B-C24DF82A0F6F}" dt="2025-12-08T06:26:42.531" v="416" actId="478"/>
-          <ac:spMkLst>
-            <pc:docMk/>
-            <pc:sldMk cId="4264677433" sldId="281"/>
-            <ac:spMk id="10" creationId="{F87A91FA-AF63-2832-CA20-5EA2369EE522}"/>
-          </ac:spMkLst>
-        </pc:spChg>
-        <pc:spChg chg="del">
-          <ac:chgData name="Matthew Dodds" userId="80d5a6ea92063750" providerId="LiveId" clId="{614D3421-716A-4CB0-994B-C24DF82A0F6F}" dt="2025-12-08T06:26:42.531" v="416" actId="478"/>
-          <ac:spMkLst>
-            <pc:docMk/>
-            <pc:sldMk cId="4264677433" sldId="281"/>
-            <ac:spMk id="11" creationId="{BFA2E9D8-4BFF-EB66-16D0-D2B171F8BCF9}"/>
-          </ac:spMkLst>
-        </pc:spChg>
-        <pc:spChg chg="del">
-          <ac:chgData name="Matthew Dodds" userId="80d5a6ea92063750" providerId="LiveId" clId="{614D3421-716A-4CB0-994B-C24DF82A0F6F}" dt="2025-12-08T06:26:42.531" v="416" actId="478"/>
-          <ac:spMkLst>
-            <pc:docMk/>
-            <pc:sldMk cId="4264677433" sldId="281"/>
-            <ac:spMk id="12" creationId="{3BBFCE26-90B9-E10B-3603-FAC5522D4094}"/>
-          </ac:spMkLst>
-        </pc:spChg>
-        <pc:spChg chg="del">
-          <ac:chgData name="Matthew Dodds" userId="80d5a6ea92063750" providerId="LiveId" clId="{614D3421-716A-4CB0-994B-C24DF82A0F6F}" dt="2025-12-08T06:26:42.531" v="416" actId="478"/>
-          <ac:spMkLst>
-            <pc:docMk/>
-            <pc:sldMk cId="4264677433" sldId="281"/>
-            <ac:spMk id="13" creationId="{D0EB1575-6CED-2B26-FCE7-82EDD1BD56AE}"/>
-          </ac:spMkLst>
-        </pc:spChg>
-        <pc:spChg chg="del">
-          <ac:chgData name="Matthew Dodds" userId="80d5a6ea92063750" providerId="LiveId" clId="{614D3421-716A-4CB0-994B-C24DF82A0F6F}" dt="2025-12-08T06:26:42.531" v="416" actId="478"/>
-          <ac:spMkLst>
-            <pc:docMk/>
-            <pc:sldMk cId="4264677433" sldId="281"/>
-            <ac:spMk id="17" creationId="{37BE46B2-E14A-BA94-7B0F-4571843014EE}"/>
-          </ac:spMkLst>
-        </pc:spChg>
-        <pc:spChg chg="del">
-          <ac:chgData name="Matthew Dodds" userId="80d5a6ea92063750" providerId="LiveId" clId="{614D3421-716A-4CB0-994B-C24DF82A0F6F}" dt="2025-12-08T06:26:42.531" v="416" actId="478"/>
-          <ac:spMkLst>
-            <pc:docMk/>
-            <pc:sldMk cId="4264677433" sldId="281"/>
-            <ac:spMk id="18" creationId="{B5B0A061-1458-B0F3-3E15-4FAD54B7EA9C}"/>
-          </ac:spMkLst>
-        </pc:spChg>
-        <pc:grpChg chg="del">
-          <ac:chgData name="Matthew Dodds" userId="80d5a6ea92063750" providerId="LiveId" clId="{614D3421-716A-4CB0-994B-C24DF82A0F6F}" dt="2025-12-08T06:26:42.531" v="416" actId="478"/>
-          <ac:grpSpMkLst>
-            <pc:docMk/>
-            <pc:sldMk cId="4264677433" sldId="281"/>
-            <ac:grpSpMk id="14" creationId="{E007DC9F-9DE8-786D-D1FE-53D73902C64D}"/>
-          </ac:grpSpMkLst>
-        </pc:grpChg>
       </pc:sldChg>
     </pc:docChg>
   </pc:docChgLst>
@@ -907,7 +776,7 @@
           <a:p>
             <a:fld id="{C6844EAE-78C4-45F3-83C5-DF449BFC3B16}" type="datetimeFigureOut">
               <a:rPr lang="en-GB" smtClean="0"/>
-              <a:t>08/12/2025</a:t>
+              <a:t>10/12/2025</a:t>
             </a:fld>
             <a:endParaRPr lang="en-GB"/>
           </a:p>
@@ -1077,7 +946,7 @@
           <a:p>
             <a:fld id="{C6844EAE-78C4-45F3-83C5-DF449BFC3B16}" type="datetimeFigureOut">
               <a:rPr lang="en-GB" smtClean="0"/>
-              <a:t>08/12/2025</a:t>
+              <a:t>10/12/2025</a:t>
             </a:fld>
             <a:endParaRPr lang="en-GB"/>
           </a:p>
@@ -1257,7 +1126,7 @@
           <a:p>
             <a:fld id="{C6844EAE-78C4-45F3-83C5-DF449BFC3B16}" type="datetimeFigureOut">
               <a:rPr lang="en-GB" smtClean="0"/>
-              <a:t>08/12/2025</a:t>
+              <a:t>10/12/2025</a:t>
             </a:fld>
             <a:endParaRPr lang="en-GB"/>
           </a:p>
@@ -1427,7 +1296,7 @@
           <a:p>
             <a:fld id="{C6844EAE-78C4-45F3-83C5-DF449BFC3B16}" type="datetimeFigureOut">
               <a:rPr lang="en-GB" smtClean="0"/>
-              <a:t>08/12/2025</a:t>
+              <a:t>10/12/2025</a:t>
             </a:fld>
             <a:endParaRPr lang="en-GB"/>
           </a:p>
@@ -1673,7 +1542,7 @@
           <a:p>
             <a:fld id="{C6844EAE-78C4-45F3-83C5-DF449BFC3B16}" type="datetimeFigureOut">
               <a:rPr lang="en-GB" smtClean="0"/>
-              <a:t>08/12/2025</a:t>
+              <a:t>10/12/2025</a:t>
             </a:fld>
             <a:endParaRPr lang="en-GB"/>
           </a:p>
@@ -1905,7 +1774,7 @@
           <a:p>
             <a:fld id="{C6844EAE-78C4-45F3-83C5-DF449BFC3B16}" type="datetimeFigureOut">
               <a:rPr lang="en-GB" smtClean="0"/>
-              <a:t>08/12/2025</a:t>
+              <a:t>10/12/2025</a:t>
             </a:fld>
             <a:endParaRPr lang="en-GB"/>
           </a:p>
@@ -2272,7 +2141,7 @@
           <a:p>
             <a:fld id="{C6844EAE-78C4-45F3-83C5-DF449BFC3B16}" type="datetimeFigureOut">
               <a:rPr lang="en-GB" smtClean="0"/>
-              <a:t>08/12/2025</a:t>
+              <a:t>10/12/2025</a:t>
             </a:fld>
             <a:endParaRPr lang="en-GB"/>
           </a:p>
@@ -2390,7 +2259,7 @@
           <a:p>
             <a:fld id="{C6844EAE-78C4-45F3-83C5-DF449BFC3B16}" type="datetimeFigureOut">
               <a:rPr lang="en-GB" smtClean="0"/>
-              <a:t>08/12/2025</a:t>
+              <a:t>10/12/2025</a:t>
             </a:fld>
             <a:endParaRPr lang="en-GB"/>
           </a:p>
@@ -2485,7 +2354,7 @@
           <a:p>
             <a:fld id="{C6844EAE-78C4-45F3-83C5-DF449BFC3B16}" type="datetimeFigureOut">
               <a:rPr lang="en-GB" smtClean="0"/>
-              <a:t>08/12/2025</a:t>
+              <a:t>10/12/2025</a:t>
             </a:fld>
             <a:endParaRPr lang="en-GB"/>
           </a:p>
@@ -2762,7 +2631,7 @@
           <a:p>
             <a:fld id="{C6844EAE-78C4-45F3-83C5-DF449BFC3B16}" type="datetimeFigureOut">
               <a:rPr lang="en-GB" smtClean="0"/>
-              <a:t>08/12/2025</a:t>
+              <a:t>10/12/2025</a:t>
             </a:fld>
             <a:endParaRPr lang="en-GB"/>
           </a:p>
@@ -3019,7 +2888,7 @@
           <a:p>
             <a:fld id="{C6844EAE-78C4-45F3-83C5-DF449BFC3B16}" type="datetimeFigureOut">
               <a:rPr lang="en-GB" smtClean="0"/>
-              <a:t>08/12/2025</a:t>
+              <a:t>10/12/2025</a:t>
             </a:fld>
             <a:endParaRPr lang="en-GB"/>
           </a:p>
@@ -3251,7 +3120,7 @@
           <a:p>
             <a:fld id="{C6844EAE-78C4-45F3-83C5-DF449BFC3B16}" type="datetimeFigureOut">
               <a:rPr lang="en-GB" smtClean="0"/>
-              <a:t>08/12/2025</a:t>
+              <a:t>10/12/2025</a:t>
             </a:fld>
             <a:endParaRPr lang="en-GB"/>
           </a:p>
@@ -5436,7 +5305,7 @@
             </a:avLst>
           </a:prstGeom>
           <a:noFill/>
-          <a:ln w="6350" cap="sq">
+          <a:ln w="12700" cap="sq">
             <a:gradFill flip="none" rotWithShape="1">
               <a:gsLst>
                 <a:gs pos="0">

</xml_diff>